<commit_message>
Update DG for storage availability in v1.4
</commit_message>
<xml_diff>
--- a/docs/diagrams/ArchitectureDiagram.pptx
+++ b/docs/diagrams/ArchitectureDiagram.pptx
@@ -208,7 +208,7 @@
           <a:p>
             <a:fld id="{F5CC4B3F-88C1-4FFA-B1B6-F41C21DC6924}" type="datetimeFigureOut">
               <a:rPr lang="en-US" smtClean="0"/>
-              <a:t>10/22/2019</a:t>
+              <a:t>10/29/2019</a:t>
             </a:fld>
             <a:endParaRPr lang="en-US"/>
           </a:p>
@@ -654,7 +654,7 @@
           <a:p>
             <a:fld id="{78C97017-6FC3-485B-9764-EAC9E56C1D49}" type="datetimeFigureOut">
               <a:rPr lang="en-US" smtClean="0"/>
-              <a:t>10/22/2019</a:t>
+              <a:t>10/29/2019</a:t>
             </a:fld>
             <a:endParaRPr lang="en-US"/>
           </a:p>
@@ -822,7 +822,7 @@
           <a:p>
             <a:fld id="{78C97017-6FC3-485B-9764-EAC9E56C1D49}" type="datetimeFigureOut">
               <a:rPr lang="en-US" smtClean="0"/>
-              <a:t>10/22/2019</a:t>
+              <a:t>10/29/2019</a:t>
             </a:fld>
             <a:endParaRPr lang="en-US"/>
           </a:p>
@@ -1000,7 +1000,7 @@
           <a:p>
             <a:fld id="{78C97017-6FC3-485B-9764-EAC9E56C1D49}" type="datetimeFigureOut">
               <a:rPr lang="en-US" smtClean="0"/>
-              <a:t>10/22/2019</a:t>
+              <a:t>10/29/2019</a:t>
             </a:fld>
             <a:endParaRPr lang="en-US"/>
           </a:p>
@@ -1168,7 +1168,7 @@
           <a:p>
             <a:fld id="{78C97017-6FC3-485B-9764-EAC9E56C1D49}" type="datetimeFigureOut">
               <a:rPr lang="en-US" smtClean="0"/>
-              <a:t>10/22/2019</a:t>
+              <a:t>10/29/2019</a:t>
             </a:fld>
             <a:endParaRPr lang="en-US"/>
           </a:p>
@@ -1413,7 +1413,7 @@
           <a:p>
             <a:fld id="{78C97017-6FC3-485B-9764-EAC9E56C1D49}" type="datetimeFigureOut">
               <a:rPr lang="en-US" smtClean="0"/>
-              <a:t>10/22/2019</a:t>
+              <a:t>10/29/2019</a:t>
             </a:fld>
             <a:endParaRPr lang="en-US"/>
           </a:p>
@@ -1698,7 +1698,7 @@
           <a:p>
             <a:fld id="{78C97017-6FC3-485B-9764-EAC9E56C1D49}" type="datetimeFigureOut">
               <a:rPr lang="en-US" smtClean="0"/>
-              <a:t>10/22/2019</a:t>
+              <a:t>10/29/2019</a:t>
             </a:fld>
             <a:endParaRPr lang="en-US"/>
           </a:p>
@@ -2117,7 +2117,7 @@
           <a:p>
             <a:fld id="{78C97017-6FC3-485B-9764-EAC9E56C1D49}" type="datetimeFigureOut">
               <a:rPr lang="en-US" smtClean="0"/>
-              <a:t>10/22/2019</a:t>
+              <a:t>10/29/2019</a:t>
             </a:fld>
             <a:endParaRPr lang="en-US"/>
           </a:p>
@@ -2234,7 +2234,7 @@
           <a:p>
             <a:fld id="{78C97017-6FC3-485B-9764-EAC9E56C1D49}" type="datetimeFigureOut">
               <a:rPr lang="en-US" smtClean="0"/>
-              <a:t>10/22/2019</a:t>
+              <a:t>10/29/2019</a:t>
             </a:fld>
             <a:endParaRPr lang="en-US"/>
           </a:p>
@@ -2329,7 +2329,7 @@
           <a:p>
             <a:fld id="{78C97017-6FC3-485B-9764-EAC9E56C1D49}" type="datetimeFigureOut">
               <a:rPr lang="en-US" smtClean="0"/>
-              <a:t>10/22/2019</a:t>
+              <a:t>10/29/2019</a:t>
             </a:fld>
             <a:endParaRPr lang="en-US"/>
           </a:p>
@@ -2604,7 +2604,7 @@
           <a:p>
             <a:fld id="{78C97017-6FC3-485B-9764-EAC9E56C1D49}" type="datetimeFigureOut">
               <a:rPr lang="en-US" smtClean="0"/>
-              <a:t>10/22/2019</a:t>
+              <a:t>10/29/2019</a:t>
             </a:fld>
             <a:endParaRPr lang="en-US"/>
           </a:p>
@@ -2856,7 +2856,7 @@
           <a:p>
             <a:fld id="{78C97017-6FC3-485B-9764-EAC9E56C1D49}" type="datetimeFigureOut">
               <a:rPr lang="en-US" smtClean="0"/>
-              <a:t>10/22/2019</a:t>
+              <a:t>10/29/2019</a:t>
             </a:fld>
             <a:endParaRPr lang="en-US"/>
           </a:p>
@@ -3067,7 +3067,7 @@
           <a:p>
             <a:fld id="{78C97017-6FC3-485B-9764-EAC9E56C1D49}" type="datetimeFigureOut">
               <a:rPr lang="en-US" smtClean="0"/>
-              <a:t>10/22/2019</a:t>
+              <a:t>10/29/2019</a:t>
             </a:fld>
             <a:endParaRPr lang="en-US"/>
           </a:p>
@@ -4591,6 +4591,50 @@
           </p:style>
         </p:cxnSp>
       </p:grpSp>
+      <p:cxnSp>
+        <p:nvCxnSpPr>
+          <p:cNvPr id="27" name="Straight Arrow Connector 26">
+            <a:extLst>
+              <a:ext uri="{FF2B5EF4-FFF2-40B4-BE49-F238E27FC236}">
+                <a16:creationId xmlns:a16="http://schemas.microsoft.com/office/drawing/2014/main" id="{DD13B949-5780-454B-9E34-DD74CF0A57FB}"/>
+              </a:ext>
+            </a:extLst>
+          </p:cNvPr>
+          <p:cNvCxnSpPr>
+            <a:cxnSpLocks/>
+          </p:cNvCxnSpPr>
+          <p:nvPr/>
+        </p:nvCxnSpPr>
+        <p:spPr>
+          <a:xfrm flipV="1">
+            <a:off x="6131733" y="2743201"/>
+            <a:ext cx="642117" cy="489501"/>
+          </a:xfrm>
+          <a:prstGeom prst="straightConnector1">
+            <a:avLst/>
+          </a:prstGeom>
+          <a:ln w="28575">
+            <a:solidFill>
+              <a:srgbClr val="7030A0"/>
+            </a:solidFill>
+            <a:tailEnd type="arrow"/>
+          </a:ln>
+        </p:spPr>
+        <p:style>
+          <a:lnRef idx="1">
+            <a:schemeClr val="accent1"/>
+          </a:lnRef>
+          <a:fillRef idx="0">
+            <a:schemeClr val="accent1"/>
+          </a:fillRef>
+          <a:effectRef idx="0">
+            <a:schemeClr val="accent1"/>
+          </a:effectRef>
+          <a:fontRef idx="minor">
+            <a:schemeClr val="tx1"/>
+          </a:fontRef>
+        </p:style>
+      </p:cxnSp>
     </p:spTree>
     <p:extLst>
       <p:ext uri="{BB962C8B-B14F-4D97-AF65-F5344CB8AC3E}">

</xml_diff>